<commit_message>
End The Front End Home Page
</commit_message>
<xml_diff>
--- a/الاوامر المستخدمة.pptx
+++ b/الاوامر المستخدمة.pptx
@@ -6,6 +6,7 @@
   </p:sldMasterIdLst>
   <p:sldIdLst>
     <p:sldId id="256" r:id="rId2"/>
+    <p:sldId id="257" r:id="rId3"/>
   </p:sldIdLst>
   <p:sldSz cx="12192000" cy="6858000"/>
   <p:notesSz cx="6858000" cy="9144000"/>
@@ -261,7 +262,7 @@
           <a:p>
             <a:fld id="{75CDF4DB-881E-45B8-9238-8A92FC13BB4B}" type="datetimeFigureOut">
               <a:rPr lang="ar-SY" smtClean="0"/>
-              <a:t>10/05/1444</a:t>
+              <a:t>20/05/1444</a:t>
             </a:fld>
             <a:endParaRPr lang="ar-SY"/>
           </a:p>
@@ -461,7 +462,7 @@
           <a:p>
             <a:fld id="{75CDF4DB-881E-45B8-9238-8A92FC13BB4B}" type="datetimeFigureOut">
               <a:rPr lang="ar-SY" smtClean="0"/>
-              <a:t>10/05/1444</a:t>
+              <a:t>20/05/1444</a:t>
             </a:fld>
             <a:endParaRPr lang="ar-SY"/>
           </a:p>
@@ -671,7 +672,7 @@
           <a:p>
             <a:fld id="{75CDF4DB-881E-45B8-9238-8A92FC13BB4B}" type="datetimeFigureOut">
               <a:rPr lang="ar-SY" smtClean="0"/>
-              <a:t>10/05/1444</a:t>
+              <a:t>20/05/1444</a:t>
             </a:fld>
             <a:endParaRPr lang="ar-SY"/>
           </a:p>
@@ -871,7 +872,7 @@
           <a:p>
             <a:fld id="{75CDF4DB-881E-45B8-9238-8A92FC13BB4B}" type="datetimeFigureOut">
               <a:rPr lang="ar-SY" smtClean="0"/>
-              <a:t>10/05/1444</a:t>
+              <a:t>20/05/1444</a:t>
             </a:fld>
             <a:endParaRPr lang="ar-SY"/>
           </a:p>
@@ -1147,7 +1148,7 @@
           <a:p>
             <a:fld id="{75CDF4DB-881E-45B8-9238-8A92FC13BB4B}" type="datetimeFigureOut">
               <a:rPr lang="ar-SY" smtClean="0"/>
-              <a:t>10/05/1444</a:t>
+              <a:t>20/05/1444</a:t>
             </a:fld>
             <a:endParaRPr lang="ar-SY"/>
           </a:p>
@@ -1415,7 +1416,7 @@
           <a:p>
             <a:fld id="{75CDF4DB-881E-45B8-9238-8A92FC13BB4B}" type="datetimeFigureOut">
               <a:rPr lang="ar-SY" smtClean="0"/>
-              <a:t>10/05/1444</a:t>
+              <a:t>20/05/1444</a:t>
             </a:fld>
             <a:endParaRPr lang="ar-SY"/>
           </a:p>
@@ -1830,7 +1831,7 @@
           <a:p>
             <a:fld id="{75CDF4DB-881E-45B8-9238-8A92FC13BB4B}" type="datetimeFigureOut">
               <a:rPr lang="ar-SY" smtClean="0"/>
-              <a:t>10/05/1444</a:t>
+              <a:t>20/05/1444</a:t>
             </a:fld>
             <a:endParaRPr lang="ar-SY"/>
           </a:p>
@@ -1972,7 +1973,7 @@
           <a:p>
             <a:fld id="{75CDF4DB-881E-45B8-9238-8A92FC13BB4B}" type="datetimeFigureOut">
               <a:rPr lang="ar-SY" smtClean="0"/>
-              <a:t>10/05/1444</a:t>
+              <a:t>20/05/1444</a:t>
             </a:fld>
             <a:endParaRPr lang="ar-SY"/>
           </a:p>
@@ -2085,7 +2086,7 @@
           <a:p>
             <a:fld id="{75CDF4DB-881E-45B8-9238-8A92FC13BB4B}" type="datetimeFigureOut">
               <a:rPr lang="ar-SY" smtClean="0"/>
-              <a:t>10/05/1444</a:t>
+              <a:t>20/05/1444</a:t>
             </a:fld>
             <a:endParaRPr lang="ar-SY"/>
           </a:p>
@@ -2398,7 +2399,7 @@
           <a:p>
             <a:fld id="{75CDF4DB-881E-45B8-9238-8A92FC13BB4B}" type="datetimeFigureOut">
               <a:rPr lang="ar-SY" smtClean="0"/>
-              <a:t>10/05/1444</a:t>
+              <a:t>20/05/1444</a:t>
             </a:fld>
             <a:endParaRPr lang="ar-SY"/>
           </a:p>
@@ -2687,7 +2688,7 @@
           <a:p>
             <a:fld id="{75CDF4DB-881E-45B8-9238-8A92FC13BB4B}" type="datetimeFigureOut">
               <a:rPr lang="ar-SY" smtClean="0"/>
-              <a:t>10/05/1444</a:t>
+              <a:t>20/05/1444</a:t>
             </a:fld>
             <a:endParaRPr lang="ar-SY"/>
           </a:p>
@@ -2930,7 +2931,7 @@
           <a:p>
             <a:fld id="{75CDF4DB-881E-45B8-9238-8A92FC13BB4B}" type="datetimeFigureOut">
               <a:rPr lang="ar-SY" smtClean="0"/>
-              <a:t>10/05/1444</a:t>
+              <a:t>20/05/1444</a:t>
             </a:fld>
             <a:endParaRPr lang="ar-SY"/>
           </a:p>
@@ -4649,6 +4650,1022 @@
 </p:sld>
 </file>
 
+<file path=ppt/slides/slide2.xml><?xml version="1.0" encoding="utf-8"?>
+<p:sld xmlns:a="http://schemas.openxmlformats.org/drawingml/2006/main" xmlns:r="http://schemas.openxmlformats.org/officeDocument/2006/relationships" xmlns:p="http://schemas.openxmlformats.org/presentationml/2006/main">
+  <p:cSld>
+    <p:spTree>
+      <p:nvGrpSpPr>
+        <p:cNvPr id="1" name=""/>
+        <p:cNvGrpSpPr/>
+        <p:nvPr/>
+      </p:nvGrpSpPr>
+      <p:grpSpPr>
+        <a:xfrm>
+          <a:off x="0" y="0"/>
+          <a:ext cx="0" cy="0"/>
+          <a:chOff x="0" y="0"/>
+          <a:chExt cx="0" cy="0"/>
+        </a:xfrm>
+      </p:grpSpPr>
+      <p:sp>
+        <p:nvSpPr>
+          <p:cNvPr id="5" name="مربع نص 4">
+            <a:extLst>
+              <a:ext uri="{FF2B5EF4-FFF2-40B4-BE49-F238E27FC236}">
+                <a16:creationId xmlns:a16="http://schemas.microsoft.com/office/drawing/2014/main" id="{787FC9BF-B38C-5A64-F25F-52587B27D02C}"/>
+              </a:ext>
+            </a:extLst>
+          </p:cNvPr>
+          <p:cNvSpPr txBox="1"/>
+          <p:nvPr/>
+        </p:nvSpPr>
+        <p:spPr>
+          <a:xfrm>
+            <a:off x="5006478" y="444019"/>
+            <a:ext cx="6924316" cy="1200329"/>
+          </a:xfrm>
+          <a:prstGeom prst="rect">
+            <a:avLst/>
+          </a:prstGeom>
+          <a:noFill/>
+        </p:spPr>
+        <p:txBody>
+          <a:bodyPr wrap="square" rtlCol="1">
+            <a:spAutoFit/>
+          </a:bodyPr>
+          <a:lstStyle/>
+          <a:p>
+            <a:r>
+              <a:rPr lang="ar-SY" dirty="0"/>
+              <a:t>التعامل مع الروابط</a:t>
+            </a:r>
+          </a:p>
+          <a:p>
+            <a:r>
+              <a:rPr lang="en-US" sz="1800" dirty="0" err="1">
+                <a:solidFill>
+                  <a:prstClr val="black"/>
+                </a:solidFill>
+                <a:latin typeface="Lucida Console" panose="020B0609040504020204" pitchFamily="49" charset="0"/>
+              </a:rPr>
+              <a:t>npm</a:t>
+            </a:r>
+            <a:r>
+              <a:rPr lang="en-US" sz="1800" dirty="0">
+                <a:solidFill>
+                  <a:prstClr val="black"/>
+                </a:solidFill>
+                <a:latin typeface="Lucida Console" panose="020B0609040504020204" pitchFamily="49" charset="0"/>
+              </a:rPr>
+              <a:t> </a:t>
+            </a:r>
+            <a:r>
+              <a:rPr lang="en-US" sz="1800" dirty="0" err="1">
+                <a:solidFill>
+                  <a:prstClr val="black"/>
+                </a:solidFill>
+                <a:latin typeface="Lucida Console" panose="020B0609040504020204" pitchFamily="49" charset="0"/>
+              </a:rPr>
+              <a:t>i</a:t>
+            </a:r>
+            <a:r>
+              <a:rPr lang="en-US" sz="1800" dirty="0">
+                <a:solidFill>
+                  <a:prstClr val="black"/>
+                </a:solidFill>
+                <a:latin typeface="Lucida Console" panose="020B0609040504020204" pitchFamily="49" charset="0"/>
+              </a:rPr>
+              <a:t> react-router-hash-link --legacy-peer-deps</a:t>
+            </a:r>
+          </a:p>
+          <a:p>
+            <a:endParaRPr lang="ar-SY" dirty="0"/>
+          </a:p>
+          <a:p>
+            <a:endParaRPr lang="ar-SY" dirty="0"/>
+          </a:p>
+        </p:txBody>
+      </p:sp>
+      <p:sp>
+        <p:nvSpPr>
+          <p:cNvPr id="3" name="مربع نص 2">
+            <a:extLst>
+              <a:ext uri="{FF2B5EF4-FFF2-40B4-BE49-F238E27FC236}">
+                <a16:creationId xmlns:a16="http://schemas.microsoft.com/office/drawing/2014/main" id="{4DBF2ECD-72CF-F2A7-F532-34D37866A089}"/>
+              </a:ext>
+            </a:extLst>
+          </p:cNvPr>
+          <p:cNvSpPr txBox="1"/>
+          <p:nvPr/>
+        </p:nvSpPr>
+        <p:spPr>
+          <a:xfrm>
+            <a:off x="4839255" y="4149404"/>
+            <a:ext cx="6097554" cy="3539430"/>
+          </a:xfrm>
+          <a:prstGeom prst="rect">
+            <a:avLst/>
+          </a:prstGeom>
+          <a:noFill/>
+        </p:spPr>
+        <p:txBody>
+          <a:bodyPr wrap="square">
+            <a:spAutoFit/>
+          </a:bodyPr>
+          <a:lstStyle/>
+          <a:p>
+            <a:r>
+              <a:rPr lang="en-US" b="0" i="0" dirty="0" err="1">
+                <a:solidFill>
+                  <a:srgbClr val="232629"/>
+                </a:solidFill>
+                <a:effectLst/>
+                <a:latin typeface="ui-monospace"/>
+              </a:rPr>
+              <a:t>npm</a:t>
+            </a:r>
+            <a:r>
+              <a:rPr lang="en-US" b="0" i="0" dirty="0">
+                <a:solidFill>
+                  <a:srgbClr val="232629"/>
+                </a:solidFill>
+                <a:effectLst/>
+                <a:latin typeface="ui-monospace"/>
+              </a:rPr>
+              <a:t> </a:t>
+            </a:r>
+            <a:r>
+              <a:rPr lang="en-US" b="0" i="0" dirty="0" err="1">
+                <a:solidFill>
+                  <a:srgbClr val="232629"/>
+                </a:solidFill>
+                <a:effectLst/>
+                <a:latin typeface="ui-monospace"/>
+              </a:rPr>
+              <a:t>i</a:t>
+            </a:r>
+            <a:r>
+              <a:rPr lang="en-US" b="0" i="0" dirty="0">
+                <a:solidFill>
+                  <a:srgbClr val="232629"/>
+                </a:solidFill>
+                <a:effectLst/>
+                <a:latin typeface="ui-monospace"/>
+              </a:rPr>
+              <a:t> react-typical --legacy-peer-deps</a:t>
+            </a:r>
+          </a:p>
+          <a:p>
+            <a:r>
+              <a:rPr kumimoji="0" lang="ar-SY" altLang="ar-SY" sz="1800" b="0" i="0" u="none" strike="noStrike" cap="none" normalizeH="0" baseline="0" dirty="0" err="1">
+                <a:ln>
+                  <a:noFill/>
+                </a:ln>
+                <a:solidFill>
+                  <a:srgbClr val="CC7832"/>
+                </a:solidFill>
+                <a:effectLst/>
+                <a:latin typeface="JetBrains Mono"/>
+              </a:rPr>
+              <a:t>import</a:t>
+            </a:r>
+            <a:r>
+              <a:rPr kumimoji="0" lang="ar-SY" altLang="ar-SY" sz="1800" b="0" i="0" u="none" strike="noStrike" cap="none" normalizeH="0" baseline="0" dirty="0">
+                <a:ln>
+                  <a:noFill/>
+                </a:ln>
+                <a:solidFill>
+                  <a:srgbClr val="CC7832"/>
+                </a:solidFill>
+                <a:effectLst/>
+                <a:latin typeface="JetBrains Mono"/>
+              </a:rPr>
+              <a:t> </a:t>
+            </a:r>
+            <a:r>
+              <a:rPr kumimoji="0" lang="ar-SY" altLang="ar-SY" sz="1800" b="1" i="1" u="none" strike="noStrike" cap="none" normalizeH="0" baseline="0" dirty="0" err="1">
+                <a:ln>
+                  <a:noFill/>
+                </a:ln>
+                <a:solidFill>
+                  <a:srgbClr val="9876AA"/>
+                </a:solidFill>
+                <a:effectLst/>
+                <a:latin typeface="JetBrains Mono"/>
+              </a:rPr>
+              <a:t>Typical</a:t>
+            </a:r>
+            <a:r>
+              <a:rPr kumimoji="0" lang="ar-SY" altLang="ar-SY" sz="1800" b="1" i="1" u="none" strike="noStrike" cap="none" normalizeH="0" baseline="0" dirty="0">
+                <a:ln>
+                  <a:noFill/>
+                </a:ln>
+                <a:solidFill>
+                  <a:srgbClr val="9876AA"/>
+                </a:solidFill>
+                <a:effectLst/>
+                <a:latin typeface="JetBrains Mono"/>
+              </a:rPr>
+              <a:t> </a:t>
+            </a:r>
+            <a:r>
+              <a:rPr kumimoji="0" lang="ar-SY" altLang="ar-SY" sz="1800" b="0" i="0" u="none" strike="noStrike" cap="none" normalizeH="0" baseline="0" dirty="0" err="1">
+                <a:ln>
+                  <a:noFill/>
+                </a:ln>
+                <a:solidFill>
+                  <a:srgbClr val="CC7832"/>
+                </a:solidFill>
+                <a:effectLst/>
+                <a:latin typeface="JetBrains Mono"/>
+              </a:rPr>
+              <a:t>from</a:t>
+            </a:r>
+            <a:r>
+              <a:rPr kumimoji="0" lang="ar-SY" altLang="ar-SY" sz="1800" b="0" i="0" u="none" strike="noStrike" cap="none" normalizeH="0" baseline="0" dirty="0">
+                <a:ln>
+                  <a:noFill/>
+                </a:ln>
+                <a:solidFill>
+                  <a:srgbClr val="CC7832"/>
+                </a:solidFill>
+                <a:effectLst/>
+                <a:latin typeface="JetBrains Mono"/>
+              </a:rPr>
+              <a:t> </a:t>
+            </a:r>
+            <a:r>
+              <a:rPr kumimoji="0" lang="ar-SY" altLang="ar-SY" sz="1800" b="0" i="0" u="none" strike="noStrike" cap="none" normalizeH="0" baseline="0" dirty="0">
+                <a:ln>
+                  <a:noFill/>
+                </a:ln>
+                <a:solidFill>
+                  <a:srgbClr val="6A8759"/>
+                </a:solidFill>
+                <a:effectLst/>
+                <a:latin typeface="JetBrains Mono"/>
+              </a:rPr>
+              <a:t>'</a:t>
+            </a:r>
+            <a:r>
+              <a:rPr kumimoji="0" lang="ar-SY" altLang="ar-SY" sz="1800" b="0" i="0" u="none" strike="noStrike" cap="none" normalizeH="0" baseline="0" dirty="0" err="1">
+                <a:ln>
+                  <a:noFill/>
+                </a:ln>
+                <a:solidFill>
+                  <a:srgbClr val="6A8759"/>
+                </a:solidFill>
+                <a:effectLst/>
+                <a:latin typeface="JetBrains Mono"/>
+              </a:rPr>
+              <a:t>react-typical</a:t>
+            </a:r>
+            <a:endParaRPr kumimoji="0" lang="ar-SY" altLang="ar-SY" sz="1800" b="0" i="0" u="none" strike="noStrike" cap="none" normalizeH="0" baseline="0" dirty="0">
+              <a:ln>
+                <a:noFill/>
+              </a:ln>
+              <a:solidFill>
+                <a:srgbClr val="6A8759"/>
+              </a:solidFill>
+              <a:effectLst/>
+              <a:latin typeface="JetBrains Mono"/>
+            </a:endParaRPr>
+          </a:p>
+          <a:p>
+            <a:endParaRPr kumimoji="0" lang="ar-SY" altLang="ar-SY" sz="1800" b="0" i="0" u="none" strike="noStrike" cap="none" normalizeH="0" baseline="0" dirty="0">
+              <a:ln>
+                <a:noFill/>
+              </a:ln>
+              <a:solidFill>
+                <a:srgbClr val="6A8759"/>
+              </a:solidFill>
+              <a:effectLst/>
+              <a:latin typeface="JetBrains Mono"/>
+            </a:endParaRPr>
+          </a:p>
+          <a:p>
+            <a:r>
+              <a:rPr lang="ar-SY" altLang="ar-SY" dirty="0">
+                <a:solidFill>
+                  <a:srgbClr val="6A8759"/>
+                </a:solidFill>
+                <a:latin typeface="JetBrains Mono"/>
+              </a:rPr>
+              <a:t>مكتبة ثانية </a:t>
+            </a:r>
+          </a:p>
+          <a:p>
+            <a:r>
+              <a:rPr kumimoji="0" lang="ar-SY" altLang="ar-SY" sz="1800" b="0" i="0" u="none" strike="noStrike" cap="none" normalizeH="0" baseline="0" dirty="0">
+                <a:ln>
+                  <a:noFill/>
+                </a:ln>
+                <a:solidFill>
+                  <a:srgbClr val="6A8759"/>
+                </a:solidFill>
+                <a:effectLst/>
+                <a:latin typeface="JetBrains Mono"/>
+              </a:rPr>
+              <a:t>‘</a:t>
+            </a:r>
+            <a:r>
+              <a:rPr lang="en-US" sz="1800" dirty="0">
+                <a:solidFill>
+                  <a:prstClr val="black"/>
+                </a:solidFill>
+                <a:latin typeface="Lucida Console" panose="020B0609040504020204" pitchFamily="49" charset="0"/>
+              </a:rPr>
+              <a:t> </a:t>
+            </a:r>
+          </a:p>
+          <a:p>
+            <a:r>
+              <a:rPr lang="en-US" sz="1800" dirty="0" err="1">
+                <a:solidFill>
+                  <a:prstClr val="black"/>
+                </a:solidFill>
+                <a:latin typeface="Lucida Console" panose="020B0609040504020204" pitchFamily="49" charset="0"/>
+              </a:rPr>
+              <a:t>npm</a:t>
+            </a:r>
+            <a:r>
+              <a:rPr lang="en-US" sz="1800" dirty="0">
+                <a:solidFill>
+                  <a:prstClr val="black"/>
+                </a:solidFill>
+                <a:latin typeface="Lucida Console" panose="020B0609040504020204" pitchFamily="49" charset="0"/>
+              </a:rPr>
+              <a:t> </a:t>
+            </a:r>
+            <a:r>
+              <a:rPr lang="en-US" sz="1800" dirty="0" err="1">
+                <a:solidFill>
+                  <a:prstClr val="black"/>
+                </a:solidFill>
+                <a:latin typeface="Lucida Console" panose="020B0609040504020204" pitchFamily="49" charset="0"/>
+              </a:rPr>
+              <a:t>i</a:t>
+            </a:r>
+            <a:r>
+              <a:rPr lang="en-US" sz="1800" dirty="0">
+                <a:solidFill>
+                  <a:prstClr val="black"/>
+                </a:solidFill>
+                <a:latin typeface="Lucida Console" panose="020B0609040504020204" pitchFamily="49" charset="0"/>
+              </a:rPr>
+              <a:t> typewriter-effect --legacy-peer-deps</a:t>
+            </a:r>
+          </a:p>
+          <a:p>
+            <a:r>
+              <a:rPr lang="ar-SY" altLang="ar-SY" dirty="0">
+                <a:solidFill>
+                  <a:srgbClr val="6A8759"/>
+                </a:solidFill>
+                <a:latin typeface="JetBrains Mono"/>
+              </a:rPr>
+              <a:t>مكتبة ثالثة </a:t>
+            </a:r>
+          </a:p>
+          <a:p>
+            <a:endParaRPr lang="en-US" dirty="0">
+              <a:solidFill>
+                <a:prstClr val="black"/>
+              </a:solidFill>
+              <a:latin typeface="Lucida Console" panose="020B0609040504020204" pitchFamily="49" charset="0"/>
+            </a:endParaRPr>
+          </a:p>
+          <a:p>
+            <a:r>
+              <a:rPr lang="en-US" sz="1800" dirty="0" err="1">
+                <a:solidFill>
+                  <a:prstClr val="black"/>
+                </a:solidFill>
+                <a:latin typeface="Lucida Console" panose="020B0609040504020204" pitchFamily="49" charset="0"/>
+              </a:rPr>
+              <a:t>npm</a:t>
+            </a:r>
+            <a:r>
+              <a:rPr lang="en-US" sz="1800" dirty="0">
+                <a:solidFill>
+                  <a:prstClr val="black"/>
+                </a:solidFill>
+                <a:latin typeface="Lucida Console" panose="020B0609040504020204" pitchFamily="49" charset="0"/>
+              </a:rPr>
+              <a:t> </a:t>
+            </a:r>
+            <a:r>
+              <a:rPr lang="en-US" sz="1800" dirty="0" err="1">
+                <a:solidFill>
+                  <a:prstClr val="black"/>
+                </a:solidFill>
+                <a:latin typeface="Lucida Console" panose="020B0609040504020204" pitchFamily="49" charset="0"/>
+              </a:rPr>
+              <a:t>i</a:t>
+            </a:r>
+            <a:r>
+              <a:rPr lang="en-US" sz="1800" dirty="0">
+                <a:solidFill>
+                  <a:prstClr val="black"/>
+                </a:solidFill>
+                <a:latin typeface="Lucida Console" panose="020B0609040504020204" pitchFamily="49" charset="0"/>
+              </a:rPr>
+              <a:t> react-typed --legacy-peer-deps</a:t>
+            </a:r>
+          </a:p>
+          <a:p>
+            <a:endParaRPr kumimoji="0" lang="ar-SY" altLang="ar-SY" sz="4400" b="0" i="0" u="none" strike="noStrike" cap="none" normalizeH="0" baseline="0" dirty="0">
+              <a:ln>
+                <a:noFill/>
+              </a:ln>
+              <a:solidFill>
+                <a:schemeClr val="tx1"/>
+              </a:solidFill>
+              <a:effectLst/>
+              <a:latin typeface="Arial" panose="020B0604020202020204" pitchFamily="34" charset="0"/>
+            </a:endParaRPr>
+          </a:p>
+          <a:p>
+            <a:endParaRPr lang="ar-SY" dirty="0"/>
+          </a:p>
+        </p:txBody>
+      </p:sp>
+      <p:sp>
+        <p:nvSpPr>
+          <p:cNvPr id="7" name="مربع نص 6">
+            <a:extLst>
+              <a:ext uri="{FF2B5EF4-FFF2-40B4-BE49-F238E27FC236}">
+                <a16:creationId xmlns:a16="http://schemas.microsoft.com/office/drawing/2014/main" id="{FFECD24F-AB83-5ED0-EA0E-3557B9264229}"/>
+              </a:ext>
+            </a:extLst>
+          </p:cNvPr>
+          <p:cNvSpPr txBox="1"/>
+          <p:nvPr/>
+        </p:nvSpPr>
+        <p:spPr>
+          <a:xfrm>
+            <a:off x="4858919" y="3635597"/>
+            <a:ext cx="6097554" cy="369332"/>
+          </a:xfrm>
+          <a:prstGeom prst="rect">
+            <a:avLst/>
+          </a:prstGeom>
+          <a:noFill/>
+        </p:spPr>
+        <p:txBody>
+          <a:bodyPr wrap="square">
+            <a:spAutoFit/>
+          </a:bodyPr>
+          <a:lstStyle/>
+          <a:p>
+            <a:r>
+              <a:rPr lang="ar-SY" dirty="0"/>
+              <a:t>تنزيل تأثير النص كتابة ومسح </a:t>
+            </a:r>
+          </a:p>
+        </p:txBody>
+      </p:sp>
+      <p:sp>
+        <p:nvSpPr>
+          <p:cNvPr id="2" name="مربع نص 1">
+            <a:extLst>
+              <a:ext uri="{FF2B5EF4-FFF2-40B4-BE49-F238E27FC236}">
+                <a16:creationId xmlns:a16="http://schemas.microsoft.com/office/drawing/2014/main" id="{950E5D1D-C9B1-FA9B-0ED0-2E096A5E9BEA}"/>
+              </a:ext>
+            </a:extLst>
+          </p:cNvPr>
+          <p:cNvSpPr txBox="1"/>
+          <p:nvPr/>
+        </p:nvSpPr>
+        <p:spPr>
+          <a:xfrm>
+            <a:off x="184731" y="3351465"/>
+            <a:ext cx="3797334" cy="646331"/>
+          </a:xfrm>
+          <a:prstGeom prst="rect">
+            <a:avLst/>
+          </a:prstGeom>
+          <a:noFill/>
+        </p:spPr>
+        <p:txBody>
+          <a:bodyPr wrap="square">
+            <a:spAutoFit/>
+          </a:bodyPr>
+          <a:lstStyle/>
+          <a:p>
+            <a:r>
+              <a:rPr kumimoji="0" lang="ar-SY" altLang="ar-SY" sz="1800" b="0" i="0" u="none" strike="noStrike" cap="none" normalizeH="0" baseline="0" dirty="0" err="1">
+                <a:ln>
+                  <a:noFill/>
+                </a:ln>
+                <a:solidFill>
+                  <a:srgbClr val="333333"/>
+                </a:solidFill>
+                <a:effectLst/>
+                <a:latin typeface="Fira Mono" panose="020B0604020202020204" pitchFamily="49" charset="0"/>
+              </a:rPr>
+              <a:t>npm</a:t>
+            </a:r>
+            <a:r>
+              <a:rPr kumimoji="0" lang="ar-SY" altLang="ar-SY" sz="1800" b="0" i="0" u="none" strike="noStrike" cap="none" normalizeH="0" baseline="0" dirty="0">
+                <a:ln>
+                  <a:noFill/>
+                </a:ln>
+                <a:solidFill>
+                  <a:srgbClr val="333333"/>
+                </a:solidFill>
+                <a:effectLst/>
+                <a:latin typeface="Fira Mono" panose="020B0604020202020204" pitchFamily="49" charset="0"/>
+              </a:rPr>
+              <a:t> i --</a:t>
+            </a:r>
+            <a:r>
+              <a:rPr kumimoji="0" lang="ar-SY" altLang="ar-SY" sz="1800" b="0" i="0" u="none" strike="noStrike" cap="none" normalizeH="0" baseline="0" dirty="0" err="1">
+                <a:ln>
+                  <a:noFill/>
+                </a:ln>
+                <a:solidFill>
+                  <a:srgbClr val="333333"/>
+                </a:solidFill>
+                <a:effectLst/>
+                <a:latin typeface="Fira Mono" panose="020B0604020202020204" pitchFamily="49" charset="0"/>
+              </a:rPr>
+              <a:t>save</a:t>
+            </a:r>
+            <a:r>
+              <a:rPr kumimoji="0" lang="ar-SY" altLang="ar-SY" sz="1800" b="0" i="0" u="none" strike="noStrike" cap="none" normalizeH="0" baseline="0" dirty="0">
+                <a:ln>
+                  <a:noFill/>
+                </a:ln>
+                <a:solidFill>
+                  <a:srgbClr val="333333"/>
+                </a:solidFill>
+                <a:effectLst/>
+                <a:latin typeface="Fira Mono" panose="020B0604020202020204" pitchFamily="49" charset="0"/>
+              </a:rPr>
+              <a:t> </a:t>
+            </a:r>
+            <a:r>
+              <a:rPr kumimoji="0" lang="ar-SY" altLang="ar-SY" sz="1800" b="0" i="0" u="none" strike="noStrike" cap="none" normalizeH="0" baseline="0" dirty="0" err="1">
+                <a:ln>
+                  <a:noFill/>
+                </a:ln>
+                <a:solidFill>
+                  <a:srgbClr val="333333"/>
+                </a:solidFill>
+                <a:effectLst/>
+                <a:latin typeface="Fira Mono" panose="020B0604020202020204" pitchFamily="49" charset="0"/>
+              </a:rPr>
+              <a:t>react-toastify</a:t>
+            </a:r>
+            <a:r>
+              <a:rPr kumimoji="0" lang="ar-SY" altLang="ar-SY" sz="1400" b="0" i="0" u="none" strike="noStrike" cap="none" normalizeH="0" baseline="0" dirty="0">
+                <a:ln>
+                  <a:noFill/>
+                </a:ln>
+                <a:solidFill>
+                  <a:schemeClr val="tx1"/>
+                </a:solidFill>
+                <a:effectLst/>
+              </a:rPr>
+              <a:t> </a:t>
+            </a:r>
+            <a:endParaRPr kumimoji="0" lang="ar-SY" altLang="ar-SY" sz="4000" b="0" i="0" u="none" strike="noStrike" cap="none" normalizeH="0" baseline="0" dirty="0">
+              <a:ln>
+                <a:noFill/>
+              </a:ln>
+              <a:solidFill>
+                <a:schemeClr val="tx1"/>
+              </a:solidFill>
+              <a:effectLst/>
+              <a:latin typeface="Arial" panose="020B0604020202020204" pitchFamily="34" charset="0"/>
+            </a:endParaRPr>
+          </a:p>
+          <a:p>
+            <a:r>
+              <a:rPr lang="en-US" sz="1800" dirty="0">
+                <a:solidFill>
+                  <a:prstClr val="black"/>
+                </a:solidFill>
+                <a:latin typeface="Lucida Console" panose="020B0609040504020204" pitchFamily="49" charset="0"/>
+              </a:rPr>
+              <a:t> --legacy-peer-deps</a:t>
+            </a:r>
+          </a:p>
+        </p:txBody>
+      </p:sp>
+      <p:sp>
+        <p:nvSpPr>
+          <p:cNvPr id="8" name="مربع نص 7">
+            <a:extLst>
+              <a:ext uri="{FF2B5EF4-FFF2-40B4-BE49-F238E27FC236}">
+                <a16:creationId xmlns:a16="http://schemas.microsoft.com/office/drawing/2014/main" id="{385C3D6A-701D-C11A-BA2B-C5D813E6C0FC}"/>
+              </a:ext>
+            </a:extLst>
+          </p:cNvPr>
+          <p:cNvSpPr txBox="1"/>
+          <p:nvPr/>
+        </p:nvSpPr>
+        <p:spPr>
+          <a:xfrm>
+            <a:off x="-2689122" y="2718598"/>
+            <a:ext cx="7177548" cy="369332"/>
+          </a:xfrm>
+          <a:prstGeom prst="rect">
+            <a:avLst/>
+          </a:prstGeom>
+          <a:noFill/>
+        </p:spPr>
+        <p:txBody>
+          <a:bodyPr wrap="square">
+            <a:spAutoFit/>
+          </a:bodyPr>
+          <a:lstStyle/>
+          <a:p>
+            <a:r>
+              <a:rPr lang="ar-SY" dirty="0"/>
+              <a:t>تنزيل مكتبة لعرض رسائل جميلة بالزاوية</a:t>
+            </a:r>
+          </a:p>
+        </p:txBody>
+      </p:sp>
+      <p:sp>
+        <p:nvSpPr>
+          <p:cNvPr id="10" name="Rectangle 1">
+            <a:extLst>
+              <a:ext uri="{FF2B5EF4-FFF2-40B4-BE49-F238E27FC236}">
+                <a16:creationId xmlns:a16="http://schemas.microsoft.com/office/drawing/2014/main" id="{9D58118F-2B98-7E3A-D714-480C9B6904BE}"/>
+              </a:ext>
+            </a:extLst>
+          </p:cNvPr>
+          <p:cNvSpPr>
+            <a:spLocks noChangeArrowheads="1"/>
+          </p:cNvSpPr>
+          <p:nvPr/>
+        </p:nvSpPr>
+        <p:spPr bwMode="auto">
+          <a:xfrm>
+            <a:off x="0" y="13180"/>
+            <a:ext cx="184731" cy="430839"/>
+          </a:xfrm>
+          <a:prstGeom prst="rect">
+            <a:avLst/>
+          </a:prstGeom>
+          <a:solidFill>
+            <a:srgbClr val="F7F7F7"/>
+          </a:solidFill>
+          <a:ln>
+            <a:noFill/>
+          </a:ln>
+          <a:effectLst/>
+          <a:extLst>
+            <a:ext uri="{91240B29-F687-4F45-9708-019B960494DF}">
+              <a14:hiddenLine xmlns:a14="http://schemas.microsoft.com/office/drawing/2010/main" w="9525">
+                <a:solidFill>
+                  <a:schemeClr val="tx1"/>
+                </a:solidFill>
+                <a:miter lim="800000"/>
+                <a:headEnd/>
+                <a:tailEnd/>
+              </a14:hiddenLine>
+            </a:ext>
+            <a:ext uri="{AF507438-7753-43E0-B8FC-AC1667EBCBE1}">
+              <a14:hiddenEffects xmlns:a14="http://schemas.microsoft.com/office/drawing/2010/main">
+                <a:effectLst>
+                  <a:outerShdw dist="35921" dir="2700000" algn="ctr" rotWithShape="0">
+                    <a:schemeClr val="bg2"/>
+                  </a:outerShdw>
+                </a:effectLst>
+              </a14:hiddenEffects>
+            </a:ext>
+          </a:extLst>
+        </p:spPr>
+        <p:txBody>
+          <a:bodyPr vert="horz" wrap="none" lIns="91440" tIns="0" rIns="91440" bIns="152352" numCol="1" anchor="ctr" anchorCtr="0" compatLnSpc="1">
+            <a:prstTxWarp prst="textNoShape">
+              <a:avLst/>
+            </a:prstTxWarp>
+            <a:spAutoFit/>
+          </a:bodyPr>
+          <a:lstStyle/>
+          <a:p>
+            <a:pPr marL="0" marR="0" lvl="0" indent="0" algn="l" defTabSz="914400" rtl="0" eaLnBrk="0" fontAlgn="base" latinLnBrk="0" hangingPunct="0">
+              <a:lnSpc>
+                <a:spcPct val="100000"/>
+              </a:lnSpc>
+              <a:spcBef>
+                <a:spcPct val="0"/>
+              </a:spcBef>
+              <a:spcAft>
+                <a:spcPct val="0"/>
+              </a:spcAft>
+              <a:buClrTx/>
+              <a:buSzTx/>
+              <a:buFontTx/>
+              <a:buNone/>
+              <a:tabLst/>
+            </a:pPr>
+            <a:endParaRPr kumimoji="0" lang="ar-SY" altLang="ar-SY" sz="1800" b="0" i="0" u="none" strike="noStrike" cap="none" normalizeH="0" baseline="0" dirty="0">
+              <a:ln>
+                <a:noFill/>
+              </a:ln>
+              <a:solidFill>
+                <a:schemeClr val="tx1"/>
+              </a:solidFill>
+              <a:effectLst/>
+              <a:latin typeface="Arial" panose="020B0604020202020204" pitchFamily="34" charset="0"/>
+            </a:endParaRPr>
+          </a:p>
+        </p:txBody>
+      </p:sp>
+      <p:sp>
+        <p:nvSpPr>
+          <p:cNvPr id="11" name="مربع نص 10">
+            <a:extLst>
+              <a:ext uri="{FF2B5EF4-FFF2-40B4-BE49-F238E27FC236}">
+                <a16:creationId xmlns:a16="http://schemas.microsoft.com/office/drawing/2014/main" id="{E80A2000-792E-7332-84B2-3A51956F616E}"/>
+              </a:ext>
+            </a:extLst>
+          </p:cNvPr>
+          <p:cNvSpPr txBox="1"/>
+          <p:nvPr/>
+        </p:nvSpPr>
+        <p:spPr>
+          <a:xfrm>
+            <a:off x="0" y="4707576"/>
+            <a:ext cx="4515088" cy="646331"/>
+          </a:xfrm>
+          <a:prstGeom prst="rect">
+            <a:avLst/>
+          </a:prstGeom>
+          <a:noFill/>
+        </p:spPr>
+        <p:txBody>
+          <a:bodyPr wrap="square">
+            <a:spAutoFit/>
+          </a:bodyPr>
+          <a:lstStyle/>
+          <a:p>
+            <a:r>
+              <a:rPr lang="en-US" sz="1800" dirty="0">
+                <a:solidFill>
+                  <a:prstClr val="black"/>
+                </a:solidFill>
+                <a:latin typeface="Lucida Console" panose="020B0609040504020204" pitchFamily="49" charset="0"/>
+              </a:rPr>
+              <a:t> </a:t>
+            </a:r>
+            <a:r>
+              <a:rPr lang="en-US" sz="1800" dirty="0" err="1">
+                <a:solidFill>
+                  <a:prstClr val="black"/>
+                </a:solidFill>
+                <a:latin typeface="Lucida Console" panose="020B0609040504020204" pitchFamily="49" charset="0"/>
+              </a:rPr>
+              <a:t>npm</a:t>
+            </a:r>
+            <a:r>
+              <a:rPr lang="en-US" sz="1800" dirty="0">
+                <a:solidFill>
+                  <a:prstClr val="black"/>
+                </a:solidFill>
+                <a:latin typeface="Lucida Console" panose="020B0609040504020204" pitchFamily="49" charset="0"/>
+              </a:rPr>
+              <a:t> </a:t>
+            </a:r>
+            <a:r>
+              <a:rPr lang="en-US" sz="1800" dirty="0" err="1">
+                <a:solidFill>
+                  <a:prstClr val="black"/>
+                </a:solidFill>
+                <a:latin typeface="Lucida Console" panose="020B0609040504020204" pitchFamily="49" charset="0"/>
+              </a:rPr>
+              <a:t>i</a:t>
+            </a:r>
+            <a:r>
+              <a:rPr lang="en-US" sz="1800" dirty="0">
+                <a:solidFill>
+                  <a:prstClr val="black"/>
+                </a:solidFill>
+                <a:latin typeface="Lucida Console" panose="020B0609040504020204" pitchFamily="49" charset="0"/>
+              </a:rPr>
+              <a:t> express </a:t>
+            </a:r>
+            <a:r>
+              <a:rPr lang="en-US" sz="1800" dirty="0" err="1">
+                <a:solidFill>
+                  <a:prstClr val="black"/>
+                </a:solidFill>
+                <a:latin typeface="Lucida Console" panose="020B0609040504020204" pitchFamily="49" charset="0"/>
+              </a:rPr>
+              <a:t>cors</a:t>
+            </a:r>
+            <a:r>
+              <a:rPr lang="en-US" sz="1800" dirty="0">
+                <a:solidFill>
+                  <a:prstClr val="black"/>
+                </a:solidFill>
+                <a:latin typeface="Lucida Console" panose="020B0609040504020204" pitchFamily="49" charset="0"/>
+              </a:rPr>
+              <a:t> </a:t>
+            </a:r>
+            <a:r>
+              <a:rPr lang="en-US" sz="1800" dirty="0" err="1">
+                <a:solidFill>
+                  <a:prstClr val="black"/>
+                </a:solidFill>
+                <a:latin typeface="Lucida Console" panose="020B0609040504020204" pitchFamily="49" charset="0"/>
+              </a:rPr>
+              <a:t>nodemailer</a:t>
+            </a:r>
+            <a:r>
+              <a:rPr lang="en-US" sz="1800" dirty="0">
+                <a:solidFill>
+                  <a:prstClr val="black"/>
+                </a:solidFill>
+                <a:latin typeface="Lucida Console" panose="020B0609040504020204" pitchFamily="49" charset="0"/>
+              </a:rPr>
+              <a:t> --legacy-peer-deps</a:t>
+            </a:r>
+          </a:p>
+        </p:txBody>
+      </p:sp>
+      <p:sp>
+        <p:nvSpPr>
+          <p:cNvPr id="12" name="مربع نص 11">
+            <a:extLst>
+              <a:ext uri="{FF2B5EF4-FFF2-40B4-BE49-F238E27FC236}">
+                <a16:creationId xmlns:a16="http://schemas.microsoft.com/office/drawing/2014/main" id="{A581B452-97DB-E706-5EED-E43475E1B5F0}"/>
+              </a:ext>
+            </a:extLst>
+          </p:cNvPr>
+          <p:cNvSpPr txBox="1"/>
+          <p:nvPr/>
+        </p:nvSpPr>
+        <p:spPr>
+          <a:xfrm>
+            <a:off x="-2689122" y="4222193"/>
+            <a:ext cx="7177548" cy="369332"/>
+          </a:xfrm>
+          <a:prstGeom prst="rect">
+            <a:avLst/>
+          </a:prstGeom>
+          <a:noFill/>
+        </p:spPr>
+        <p:txBody>
+          <a:bodyPr wrap="square">
+            <a:spAutoFit/>
+          </a:bodyPr>
+          <a:lstStyle/>
+          <a:p>
+            <a:r>
+              <a:rPr lang="ar-SY" dirty="0"/>
+              <a:t>تنزيل مكتبة للتعامل مع رسائل البريد الالكتروني</a:t>
+            </a:r>
+          </a:p>
+        </p:txBody>
+      </p:sp>
+      <p:sp>
+        <p:nvSpPr>
+          <p:cNvPr id="13" name="مربع نص 12">
+            <a:extLst>
+              <a:ext uri="{FF2B5EF4-FFF2-40B4-BE49-F238E27FC236}">
+                <a16:creationId xmlns:a16="http://schemas.microsoft.com/office/drawing/2014/main" id="{43846BB6-E638-EB1A-5DDD-0D05D85D7EE4}"/>
+              </a:ext>
+            </a:extLst>
+          </p:cNvPr>
+          <p:cNvSpPr txBox="1"/>
+          <p:nvPr/>
+        </p:nvSpPr>
+        <p:spPr>
+          <a:xfrm>
+            <a:off x="-26662" y="5919119"/>
+            <a:ext cx="4515088" cy="646331"/>
+          </a:xfrm>
+          <a:prstGeom prst="rect">
+            <a:avLst/>
+          </a:prstGeom>
+          <a:noFill/>
+        </p:spPr>
+        <p:txBody>
+          <a:bodyPr wrap="square">
+            <a:spAutoFit/>
+          </a:bodyPr>
+          <a:lstStyle/>
+          <a:p>
+            <a:r>
+              <a:rPr lang="en-US" sz="1800" dirty="0" err="1">
+                <a:solidFill>
+                  <a:prstClr val="black"/>
+                </a:solidFill>
+                <a:latin typeface="Lucida Console" panose="020B0609040504020204" pitchFamily="49" charset="0"/>
+              </a:rPr>
+              <a:t>npm</a:t>
+            </a:r>
+            <a:r>
+              <a:rPr lang="en-US" sz="1800" dirty="0">
+                <a:solidFill>
+                  <a:prstClr val="black"/>
+                </a:solidFill>
+                <a:latin typeface="Lucida Console" panose="020B0609040504020204" pitchFamily="49" charset="0"/>
+              </a:rPr>
+              <a:t> </a:t>
+            </a:r>
+            <a:r>
+              <a:rPr lang="en-US" sz="1800" dirty="0" err="1">
+                <a:solidFill>
+                  <a:prstClr val="black"/>
+                </a:solidFill>
+                <a:latin typeface="Lucida Console" panose="020B0609040504020204" pitchFamily="49" charset="0"/>
+              </a:rPr>
+              <a:t>i</a:t>
+            </a:r>
+            <a:r>
+              <a:rPr lang="en-US" sz="1800" dirty="0">
+                <a:solidFill>
+                  <a:prstClr val="black"/>
+                </a:solidFill>
+                <a:latin typeface="Lucida Console" panose="020B0609040504020204" pitchFamily="49" charset="0"/>
+              </a:rPr>
+              <a:t> react-</a:t>
+            </a:r>
+            <a:r>
+              <a:rPr lang="en-US" sz="1800" dirty="0" err="1">
+                <a:solidFill>
+                  <a:prstClr val="black"/>
+                </a:solidFill>
+                <a:latin typeface="Lucida Console" panose="020B0609040504020204" pitchFamily="49" charset="0"/>
+              </a:rPr>
+              <a:t>mailchimp</a:t>
+            </a:r>
+            <a:r>
+              <a:rPr lang="en-US" sz="1800" dirty="0">
+                <a:solidFill>
+                  <a:prstClr val="black"/>
+                </a:solidFill>
+                <a:latin typeface="Lucida Console" panose="020B0609040504020204" pitchFamily="49" charset="0"/>
+              </a:rPr>
+              <a:t>-subscribe --legacy-peer-deps</a:t>
+            </a:r>
+          </a:p>
+        </p:txBody>
+      </p:sp>
+      <p:sp>
+        <p:nvSpPr>
+          <p:cNvPr id="14" name="مربع نص 13">
+            <a:extLst>
+              <a:ext uri="{FF2B5EF4-FFF2-40B4-BE49-F238E27FC236}">
+                <a16:creationId xmlns:a16="http://schemas.microsoft.com/office/drawing/2014/main" id="{33B1E9AF-2547-227E-D1AA-242AC1EE0E66}"/>
+              </a:ext>
+            </a:extLst>
+          </p:cNvPr>
+          <p:cNvSpPr txBox="1"/>
+          <p:nvPr/>
+        </p:nvSpPr>
+        <p:spPr>
+          <a:xfrm>
+            <a:off x="-2689122" y="5451847"/>
+            <a:ext cx="7177548" cy="369332"/>
+          </a:xfrm>
+          <a:prstGeom prst="rect">
+            <a:avLst/>
+          </a:prstGeom>
+          <a:noFill/>
+        </p:spPr>
+        <p:txBody>
+          <a:bodyPr wrap="square">
+            <a:spAutoFit/>
+          </a:bodyPr>
+          <a:lstStyle/>
+          <a:p>
+            <a:r>
+              <a:rPr lang="ar-SY" dirty="0"/>
+              <a:t>تنزيل مكتبة </a:t>
+            </a:r>
+            <a:r>
+              <a:rPr lang="ar-SY" dirty="0" err="1"/>
+              <a:t>لارسال</a:t>
+            </a:r>
+            <a:r>
+              <a:rPr lang="ar-SY" dirty="0"/>
+              <a:t> رسائل بريد الكتروني </a:t>
+            </a:r>
+          </a:p>
+        </p:txBody>
+      </p:sp>
+    </p:spTree>
+    <p:extLst>
+      <p:ext uri="{BB962C8B-B14F-4D97-AF65-F5344CB8AC3E}">
+        <p14:creationId xmlns:p14="http://schemas.microsoft.com/office/powerpoint/2010/main" val="2416269448"/>
+      </p:ext>
+    </p:extLst>
+  </p:cSld>
+  <p:clrMapOvr>
+    <a:masterClrMapping/>
+  </p:clrMapOvr>
+</p:sld>
+</file>
+
 <file path=ppt/theme/theme1.xml><?xml version="1.0" encoding="utf-8"?>
 <a:theme xmlns:a="http://schemas.openxmlformats.org/drawingml/2006/main" name="نسق Office">
   <a:themeElements>

</xml_diff>